<commit_message>
Made query param optional and updated doc
</commit_message>
<xml_diff>
--- a/ecommerceWS/doc.pptx
+++ b/ecommerceWS/doc.pptx
@@ -6,16 +6,17 @@
   </p:sldMasterIdLst>
   <p:sldIdLst>
     <p:sldId id="266" r:id="rId2"/>
-    <p:sldId id="260" r:id="rId3"/>
-    <p:sldId id="261" r:id="rId4"/>
-    <p:sldId id="256" r:id="rId5"/>
-    <p:sldId id="257" r:id="rId6"/>
-    <p:sldId id="258" r:id="rId7"/>
-    <p:sldId id="259" r:id="rId8"/>
-    <p:sldId id="262" r:id="rId9"/>
-    <p:sldId id="263" r:id="rId10"/>
-    <p:sldId id="264" r:id="rId11"/>
-    <p:sldId id="265" r:id="rId12"/>
+    <p:sldId id="267" r:id="rId3"/>
+    <p:sldId id="260" r:id="rId4"/>
+    <p:sldId id="261" r:id="rId5"/>
+    <p:sldId id="256" r:id="rId6"/>
+    <p:sldId id="257" r:id="rId7"/>
+    <p:sldId id="258" r:id="rId8"/>
+    <p:sldId id="259" r:id="rId9"/>
+    <p:sldId id="262" r:id="rId10"/>
+    <p:sldId id="263" r:id="rId11"/>
+    <p:sldId id="264" r:id="rId12"/>
+    <p:sldId id="265" r:id="rId13"/>
   </p:sldIdLst>
   <p:sldSz cx="12192000" cy="6858000"/>
   <p:notesSz cx="6858000" cy="9144000"/>
@@ -3447,7 +3448,6 @@
               <a:rPr lang="en-US" sz="1200" dirty="0"/>
               <a:t>GO</a:t>
             </a:r>
-            <a:endParaRPr lang="en-US" sz="1200" dirty="0"/>
           </a:p>
         </p:txBody>
       </p:sp>
@@ -3511,9 +3511,39 @@
           <a:chExt cx="0" cy="0"/>
         </a:xfrm>
       </p:grpSpPr>
+      <p:sp>
+        <p:nvSpPr>
+          <p:cNvPr id="4" name="TextBox 3"/>
+          <p:cNvSpPr txBox="1"/>
+          <p:nvPr/>
+        </p:nvSpPr>
+        <p:spPr>
+          <a:xfrm>
+            <a:off x="4340993" y="259883"/>
+            <a:ext cx="2312493" cy="369332"/>
+          </a:xfrm>
+          <a:prstGeom prst="rect">
+            <a:avLst/>
+          </a:prstGeom>
+          <a:noFill/>
+        </p:spPr>
+        <p:txBody>
+          <a:bodyPr wrap="none" rtlCol="0">
+            <a:spAutoFit/>
+          </a:bodyPr>
+          <a:lstStyle/>
+          <a:p>
+            <a:r>
+              <a:rPr lang="en-US" dirty="0" smtClean="0"/>
+              <a:t>Product GET operation</a:t>
+            </a:r>
+            <a:endParaRPr lang="en-US" dirty="0"/>
+          </a:p>
+        </p:txBody>
+      </p:sp>
       <p:pic>
         <p:nvPicPr>
-          <p:cNvPr id="2" name="Picture 1"/>
+          <p:cNvPr id="3" name="Picture 2"/>
           <p:cNvPicPr>
             <a:picLocks noChangeAspect="1"/>
           </p:cNvPicPr>
@@ -3527,48 +3557,18 @@
         </p:blipFill>
         <p:spPr>
           <a:xfrm>
-            <a:off x="1761424" y="654517"/>
-            <a:ext cx="7835014" cy="6203483"/>
+            <a:off x="542925" y="629215"/>
+            <a:ext cx="11106150" cy="6002591"/>
           </a:xfrm>
           <a:prstGeom prst="rect">
             <a:avLst/>
           </a:prstGeom>
         </p:spPr>
       </p:pic>
-      <p:sp>
-        <p:nvSpPr>
-          <p:cNvPr id="3" name="TextBox 2"/>
-          <p:cNvSpPr txBox="1"/>
-          <p:nvPr/>
-        </p:nvSpPr>
-        <p:spPr>
-          <a:xfrm>
-            <a:off x="4340993" y="259883"/>
-            <a:ext cx="2320507" cy="369332"/>
-          </a:xfrm>
-          <a:prstGeom prst="rect">
-            <a:avLst/>
-          </a:prstGeom>
-          <a:noFill/>
-        </p:spPr>
-        <p:txBody>
-          <a:bodyPr wrap="none" rtlCol="0">
-            <a:spAutoFit/>
-          </a:bodyPr>
-          <a:lstStyle/>
-          <a:p>
-            <a:r>
-              <a:rPr lang="en-US" dirty="0" smtClean="0"/>
-              <a:t>Product PUT operation</a:t>
-            </a:r>
-            <a:endParaRPr lang="en-US" dirty="0"/>
-          </a:p>
-        </p:txBody>
-      </p:sp>
     </p:spTree>
     <p:extLst>
       <p:ext uri="{BB962C8B-B14F-4D97-AF65-F5344CB8AC3E}">
-        <p14:creationId xmlns:p14="http://schemas.microsoft.com/office/powerpoint/2010/main" val="3449883931"/>
+        <p14:creationId xmlns:p14="http://schemas.microsoft.com/office/powerpoint/2010/main" val="1030871440"/>
       </p:ext>
     </p:extLst>
   </p:cSld>
@@ -3618,6 +3618,97 @@
         </p:blipFill>
         <p:spPr>
           <a:xfrm>
+            <a:off x="1761424" y="654517"/>
+            <a:ext cx="7835014" cy="6203483"/>
+          </a:xfrm>
+          <a:prstGeom prst="rect">
+            <a:avLst/>
+          </a:prstGeom>
+        </p:spPr>
+      </p:pic>
+      <p:sp>
+        <p:nvSpPr>
+          <p:cNvPr id="3" name="TextBox 2"/>
+          <p:cNvSpPr txBox="1"/>
+          <p:nvPr/>
+        </p:nvSpPr>
+        <p:spPr>
+          <a:xfrm>
+            <a:off x="4340993" y="259883"/>
+            <a:ext cx="2320507" cy="369332"/>
+          </a:xfrm>
+          <a:prstGeom prst="rect">
+            <a:avLst/>
+          </a:prstGeom>
+          <a:noFill/>
+        </p:spPr>
+        <p:txBody>
+          <a:bodyPr wrap="none" rtlCol="0">
+            <a:spAutoFit/>
+          </a:bodyPr>
+          <a:lstStyle/>
+          <a:p>
+            <a:r>
+              <a:rPr lang="en-US" dirty="0" smtClean="0"/>
+              <a:t>Product PUT operation</a:t>
+            </a:r>
+            <a:endParaRPr lang="en-US" dirty="0"/>
+          </a:p>
+        </p:txBody>
+      </p:sp>
+    </p:spTree>
+    <p:extLst>
+      <p:ext uri="{BB962C8B-B14F-4D97-AF65-F5344CB8AC3E}">
+        <p14:creationId xmlns:p14="http://schemas.microsoft.com/office/powerpoint/2010/main" val="3449883931"/>
+      </p:ext>
+    </p:extLst>
+  </p:cSld>
+  <p:clrMapOvr>
+    <a:masterClrMapping/>
+  </p:clrMapOvr>
+  <p:timing>
+    <p:tnLst>
+      <p:par>
+        <p:cTn id="1" dur="indefinite" restart="never" nodeType="tmRoot"/>
+      </p:par>
+    </p:tnLst>
+  </p:timing>
+</p:sld>
+</file>
+
+<file path=ppt/slides/slide12.xml><?xml version="1.0" encoding="utf-8"?>
+<p:sld xmlns:a="http://schemas.openxmlformats.org/drawingml/2006/main" xmlns:r="http://schemas.openxmlformats.org/officeDocument/2006/relationships" xmlns:p="http://schemas.openxmlformats.org/presentationml/2006/main">
+  <p:cSld>
+    <p:spTree>
+      <p:nvGrpSpPr>
+        <p:cNvPr id="1" name=""/>
+        <p:cNvGrpSpPr/>
+        <p:nvPr/>
+      </p:nvGrpSpPr>
+      <p:grpSpPr>
+        <a:xfrm>
+          <a:off x="0" y="0"/>
+          <a:ext cx="0" cy="0"/>
+          <a:chOff x="0" y="0"/>
+          <a:chExt cx="0" cy="0"/>
+        </a:xfrm>
+      </p:grpSpPr>
+      <p:pic>
+        <p:nvPicPr>
+          <p:cNvPr id="2" name="Picture 1"/>
+          <p:cNvPicPr>
+            <a:picLocks noChangeAspect="1"/>
+          </p:cNvPicPr>
+          <p:nvPr/>
+        </p:nvPicPr>
+        <p:blipFill>
+          <a:blip r:embed="rId2"/>
+          <a:stretch>
+            <a:fillRect/>
+          </a:stretch>
+        </p:blipFill>
+        <p:spPr>
+          <a:xfrm>
             <a:off x="900112" y="750770"/>
             <a:ext cx="10391775" cy="6126279"/>
           </a:xfrm>
@@ -3677,6 +3768,66 @@
 </file>
 
 <file path=ppt/slides/slide2.xml><?xml version="1.0" encoding="utf-8"?>
+<p:sld xmlns:a="http://schemas.openxmlformats.org/drawingml/2006/main" xmlns:r="http://schemas.openxmlformats.org/officeDocument/2006/relationships" xmlns:p="http://schemas.openxmlformats.org/presentationml/2006/main">
+  <p:cSld>
+    <p:spTree>
+      <p:nvGrpSpPr>
+        <p:cNvPr id="1" name=""/>
+        <p:cNvGrpSpPr/>
+        <p:nvPr/>
+      </p:nvGrpSpPr>
+      <p:grpSpPr>
+        <a:xfrm>
+          <a:off x="0" y="0"/>
+          <a:ext cx="0" cy="0"/>
+          <a:chOff x="0" y="0"/>
+          <a:chExt cx="0" cy="0"/>
+        </a:xfrm>
+      </p:grpSpPr>
+      <p:sp>
+        <p:nvSpPr>
+          <p:cNvPr id="3" name="TextBox 2"/>
+          <p:cNvSpPr txBox="1"/>
+          <p:nvPr/>
+        </p:nvSpPr>
+        <p:spPr>
+          <a:xfrm>
+            <a:off x="5112913" y="308009"/>
+            <a:ext cx="816249" cy="369332"/>
+          </a:xfrm>
+          <a:prstGeom prst="rect">
+            <a:avLst/>
+          </a:prstGeom>
+          <a:noFill/>
+        </p:spPr>
+        <p:txBody>
+          <a:bodyPr wrap="none" rtlCol="0">
+            <a:spAutoFit/>
+          </a:bodyPr>
+          <a:lstStyle/>
+          <a:p>
+            <a:r>
+              <a:rPr lang="en-US" dirty="0" smtClean="0"/>
+              <a:t>Design</a:t>
+            </a:r>
+            <a:endParaRPr lang="en-US" dirty="0"/>
+          </a:p>
+        </p:txBody>
+      </p:sp>
+    </p:spTree>
+    <p:extLst>
+      <p:ext uri="{BB962C8B-B14F-4D97-AF65-F5344CB8AC3E}">
+        <p14:creationId xmlns:p14="http://schemas.microsoft.com/office/powerpoint/2010/main" val="3026131348"/>
+      </p:ext>
+    </p:extLst>
+  </p:cSld>
+  <p:clrMapOvr>
+    <a:masterClrMapping/>
+  </p:clrMapOvr>
+</p:sld>
+</file>
+
+<file path=ppt/slides/slide3.xml><?xml version="1.0" encoding="utf-8"?>
 <p:sld xmlns:a="http://schemas.openxmlformats.org/drawingml/2006/main" xmlns:r="http://schemas.openxmlformats.org/officeDocument/2006/relationships" xmlns:p="http://schemas.openxmlformats.org/presentationml/2006/main">
   <p:cSld>
     <p:spTree>
@@ -3767,7 +3918,7 @@
 </p:sld>
 </file>
 
-<file path=ppt/slides/slide3.xml><?xml version="1.0" encoding="utf-8"?>
+<file path=ppt/slides/slide4.xml><?xml version="1.0" encoding="utf-8"?>
 <p:sld xmlns:a="http://schemas.openxmlformats.org/drawingml/2006/main" xmlns:r="http://schemas.openxmlformats.org/officeDocument/2006/relationships" xmlns:p="http://schemas.openxmlformats.org/presentationml/2006/main">
   <p:cSld>
     <p:spTree>
@@ -3858,7 +4009,7 @@
 </p:sld>
 </file>
 
-<file path=ppt/slides/slide4.xml><?xml version="1.0" encoding="utf-8"?>
+<file path=ppt/slides/slide5.xml><?xml version="1.0" encoding="utf-8"?>
 <p:sld xmlns:a="http://schemas.openxmlformats.org/drawingml/2006/main" xmlns:r="http://schemas.openxmlformats.org/officeDocument/2006/relationships" xmlns:p="http://schemas.openxmlformats.org/presentationml/2006/main">
   <p:cSld>
     <p:spTree>
@@ -3933,97 +4084,6 @@
     <p:extLst>
       <p:ext uri="{BB962C8B-B14F-4D97-AF65-F5344CB8AC3E}">
         <p14:creationId xmlns:p14="http://schemas.microsoft.com/office/powerpoint/2010/main" val="732577574"/>
-      </p:ext>
-    </p:extLst>
-  </p:cSld>
-  <p:clrMapOvr>
-    <a:masterClrMapping/>
-  </p:clrMapOvr>
-  <p:timing>
-    <p:tnLst>
-      <p:par>
-        <p:cTn id="1" dur="indefinite" restart="never" nodeType="tmRoot"/>
-      </p:par>
-    </p:tnLst>
-  </p:timing>
-</p:sld>
-</file>
-
-<file path=ppt/slides/slide5.xml><?xml version="1.0" encoding="utf-8"?>
-<p:sld xmlns:a="http://schemas.openxmlformats.org/drawingml/2006/main" xmlns:r="http://schemas.openxmlformats.org/officeDocument/2006/relationships" xmlns:p="http://schemas.openxmlformats.org/presentationml/2006/main">
-  <p:cSld>
-    <p:spTree>
-      <p:nvGrpSpPr>
-        <p:cNvPr id="1" name=""/>
-        <p:cNvGrpSpPr/>
-        <p:nvPr/>
-      </p:nvGrpSpPr>
-      <p:grpSpPr>
-        <a:xfrm>
-          <a:off x="0" y="0"/>
-          <a:ext cx="0" cy="0"/>
-          <a:chOff x="0" y="0"/>
-          <a:chExt cx="0" cy="0"/>
-        </a:xfrm>
-      </p:grpSpPr>
-      <p:pic>
-        <p:nvPicPr>
-          <p:cNvPr id="4" name="Picture 3"/>
-          <p:cNvPicPr>
-            <a:picLocks noChangeAspect="1"/>
-          </p:cNvPicPr>
-          <p:nvPr/>
-        </p:nvPicPr>
-        <p:blipFill>
-          <a:blip r:embed="rId2"/>
-          <a:stretch>
-            <a:fillRect/>
-          </a:stretch>
-        </p:blipFill>
-        <p:spPr>
-          <a:xfrm>
-            <a:off x="548640" y="654518"/>
-            <a:ext cx="11100435" cy="6035040"/>
-          </a:xfrm>
-          <a:prstGeom prst="rect">
-            <a:avLst/>
-          </a:prstGeom>
-        </p:spPr>
-      </p:pic>
-      <p:sp>
-        <p:nvSpPr>
-          <p:cNvPr id="3" name="TextBox 2"/>
-          <p:cNvSpPr txBox="1"/>
-          <p:nvPr/>
-        </p:nvSpPr>
-        <p:spPr>
-          <a:xfrm>
-            <a:off x="4398745" y="227434"/>
-            <a:ext cx="2413738" cy="369332"/>
-          </a:xfrm>
-          <a:prstGeom prst="rect">
-            <a:avLst/>
-          </a:prstGeom>
-          <a:noFill/>
-        </p:spPr>
-        <p:txBody>
-          <a:bodyPr wrap="none" rtlCol="0">
-            <a:spAutoFit/>
-          </a:bodyPr>
-          <a:lstStyle/>
-          <a:p>
-            <a:r>
-              <a:rPr lang="en-US" dirty="0" smtClean="0"/>
-              <a:t>Category GET operation</a:t>
-            </a:r>
-            <a:endParaRPr lang="en-US" dirty="0"/>
-          </a:p>
-        </p:txBody>
-      </p:sp>
-    </p:spTree>
-    <p:extLst>
-      <p:ext uri="{BB962C8B-B14F-4D97-AF65-F5344CB8AC3E}">
-        <p14:creationId xmlns:p14="http://schemas.microsoft.com/office/powerpoint/2010/main" val="4156156345"/>
       </p:ext>
     </p:extLst>
   </p:cSld>
@@ -4073,8 +4133,8 @@
         </p:blipFill>
         <p:spPr>
           <a:xfrm>
-            <a:off x="471638" y="702643"/>
-            <a:ext cx="11309684" cy="6025415"/>
+            <a:off x="548640" y="654518"/>
+            <a:ext cx="11100435" cy="6035040"/>
           </a:xfrm>
           <a:prstGeom prst="rect">
             <a:avLst/>
@@ -4090,7 +4150,7 @@
         <p:spPr>
           <a:xfrm>
             <a:off x="4398745" y="227434"/>
-            <a:ext cx="2421753" cy="369332"/>
+            <a:ext cx="2413738" cy="369332"/>
           </a:xfrm>
           <a:prstGeom prst="rect">
             <a:avLst/>
@@ -4105,7 +4165,7 @@
           <a:p>
             <a:r>
               <a:rPr lang="en-US" dirty="0" smtClean="0"/>
-              <a:t>Category PUT operation</a:t>
+              <a:t>Category GET operation</a:t>
             </a:r>
             <a:endParaRPr lang="en-US" dirty="0"/>
           </a:p>
@@ -4114,7 +4174,7 @@
     </p:spTree>
     <p:extLst>
       <p:ext uri="{BB962C8B-B14F-4D97-AF65-F5344CB8AC3E}">
-        <p14:creationId xmlns:p14="http://schemas.microsoft.com/office/powerpoint/2010/main" val="4283267822"/>
+        <p14:creationId xmlns:p14="http://schemas.microsoft.com/office/powerpoint/2010/main" val="4156156345"/>
       </p:ext>
     </p:extLst>
   </p:cSld>
@@ -4164,8 +4224,8 @@
         </p:blipFill>
         <p:spPr>
           <a:xfrm>
-            <a:off x="221381" y="779646"/>
-            <a:ext cx="11839074" cy="6078354"/>
+            <a:off x="471638" y="702643"/>
+            <a:ext cx="11309684" cy="6025415"/>
           </a:xfrm>
           <a:prstGeom prst="rect">
             <a:avLst/>
@@ -4181,7 +4241,7 @@
         <p:spPr>
           <a:xfrm>
             <a:off x="4398745" y="227434"/>
-            <a:ext cx="2732736" cy="369332"/>
+            <a:ext cx="2421753" cy="369332"/>
           </a:xfrm>
           <a:prstGeom prst="rect">
             <a:avLst/>
@@ -4196,7 +4256,7 @@
           <a:p>
             <a:r>
               <a:rPr lang="en-US" dirty="0" smtClean="0"/>
-              <a:t>Category DELETE operation</a:t>
+              <a:t>Category PUT operation</a:t>
             </a:r>
             <a:endParaRPr lang="en-US" dirty="0"/>
           </a:p>
@@ -4205,7 +4265,7 @@
     </p:spTree>
     <p:extLst>
       <p:ext uri="{BB962C8B-B14F-4D97-AF65-F5344CB8AC3E}">
-        <p14:creationId xmlns:p14="http://schemas.microsoft.com/office/powerpoint/2010/main" val="2859490900"/>
+        <p14:creationId xmlns:p14="http://schemas.microsoft.com/office/powerpoint/2010/main" val="4283267822"/>
       </p:ext>
     </p:extLst>
   </p:cSld>
@@ -4241,7 +4301,7 @@
       </p:grpSpPr>
       <p:pic>
         <p:nvPicPr>
-          <p:cNvPr id="2" name="Picture 1"/>
+          <p:cNvPr id="4" name="Picture 3"/>
           <p:cNvPicPr>
             <a:picLocks noChangeAspect="1"/>
           </p:cNvPicPr>
@@ -4255,8 +4315,8 @@
         </p:blipFill>
         <p:spPr>
           <a:xfrm>
-            <a:off x="529388" y="741145"/>
-            <a:ext cx="11097929" cy="6006164"/>
+            <a:off x="221381" y="779646"/>
+            <a:ext cx="11839074" cy="6078354"/>
           </a:xfrm>
           <a:prstGeom prst="rect">
             <a:avLst/>
@@ -4271,8 +4331,8 @@
         </p:nvSpPr>
         <p:spPr>
           <a:xfrm>
-            <a:off x="4340993" y="259883"/>
-            <a:ext cx="2519279" cy="369332"/>
+            <a:off x="4398745" y="227434"/>
+            <a:ext cx="2732736" cy="369332"/>
           </a:xfrm>
           <a:prstGeom prst="rect">
             <a:avLst/>
@@ -4287,7 +4347,7 @@
           <a:p>
             <a:r>
               <a:rPr lang="en-US" dirty="0" smtClean="0"/>
-              <a:t>Product POST operation</a:t>
+              <a:t>Category DELETE operation</a:t>
             </a:r>
             <a:endParaRPr lang="en-US" dirty="0"/>
           </a:p>
@@ -4296,7 +4356,7 @@
     </p:spTree>
     <p:extLst>
       <p:ext uri="{BB962C8B-B14F-4D97-AF65-F5344CB8AC3E}">
-        <p14:creationId xmlns:p14="http://schemas.microsoft.com/office/powerpoint/2010/main" val="171263787"/>
+        <p14:creationId xmlns:p14="http://schemas.microsoft.com/office/powerpoint/2010/main" val="2859490900"/>
       </p:ext>
     </p:extLst>
   </p:cSld>
@@ -4346,8 +4406,8 @@
         </p:blipFill>
         <p:spPr>
           <a:xfrm>
-            <a:off x="890587" y="654517"/>
-            <a:ext cx="10410825" cy="6203483"/>
+            <a:off x="529388" y="741145"/>
+            <a:ext cx="11097929" cy="6006164"/>
           </a:xfrm>
           <a:prstGeom prst="rect">
             <a:avLst/>
@@ -4356,14 +4416,14 @@
       </p:pic>
       <p:sp>
         <p:nvSpPr>
-          <p:cNvPr id="4" name="TextBox 3"/>
+          <p:cNvPr id="3" name="TextBox 2"/>
           <p:cNvSpPr txBox="1"/>
           <p:nvPr/>
         </p:nvSpPr>
         <p:spPr>
           <a:xfrm>
             <a:off x="4340993" y="259883"/>
-            <a:ext cx="2312493" cy="369332"/>
+            <a:ext cx="2519279" cy="369332"/>
           </a:xfrm>
           <a:prstGeom prst="rect">
             <a:avLst/>
@@ -4378,7 +4438,7 @@
           <a:p>
             <a:r>
               <a:rPr lang="en-US" dirty="0" smtClean="0"/>
-              <a:t>Product GET operation</a:t>
+              <a:t>Product POST operation</a:t>
             </a:r>
             <a:endParaRPr lang="en-US" dirty="0"/>
           </a:p>
@@ -4387,7 +4447,7 @@
     </p:spTree>
     <p:extLst>
       <p:ext uri="{BB962C8B-B14F-4D97-AF65-F5344CB8AC3E}">
-        <p14:creationId xmlns:p14="http://schemas.microsoft.com/office/powerpoint/2010/main" val="1030871440"/>
+        <p14:creationId xmlns:p14="http://schemas.microsoft.com/office/powerpoint/2010/main" val="171263787"/>
       </p:ext>
     </p:extLst>
   </p:cSld>

</xml_diff>